<commit_message>
added couple of figures for different loads on uCRM 13.5
</commit_message>
<xml_diff>
--- a/Flowchart.pptx
+++ b/Flowchart.pptx
@@ -9,6 +9,8 @@
     <p:sldId id="260" r:id="rId3"/>
     <p:sldId id="258" r:id="rId4"/>
     <p:sldId id="259" r:id="rId5"/>
+    <p:sldId id="261" r:id="rId6"/>
+    <p:sldId id="262" r:id="rId7"/>
   </p:sldIdLst>
   <p:sldSz cx="12192000" cy="6858000"/>
   <p:notesSz cx="6858000" cy="9144000"/>
@@ -125,30 +127,6 @@
 
 <file path=ppt/changesInfos/changesInfo1.xml><?xml version="1.0" encoding="utf-8"?>
 <pc:chgInfo xmlns:a="http://schemas.openxmlformats.org/drawingml/2006/main" xmlns:r="http://schemas.openxmlformats.org/officeDocument/2006/relationships" xmlns:ac="http://schemas.microsoft.com/office/drawing/2013/main/command" xmlns:pc="http://schemas.microsoft.com/office/powerpoint/2013/main/command">
-  <pc:docChgLst>
-    <pc:chgData name="Bilal Sharqi" userId="d561ffde75f42bc1" providerId="LiveId" clId="{0F5F4506-6DB1-4EB6-80E4-A682BB529050}"/>
-    <pc:docChg chg="modSld">
-      <pc:chgData name="Bilal Sharqi" userId="d561ffde75f42bc1" providerId="LiveId" clId="{0F5F4506-6DB1-4EB6-80E4-A682BB529050}" dt="2020-08-26T22:20:56.344" v="0" actId="1076"/>
-      <pc:docMkLst>
-        <pc:docMk/>
-      </pc:docMkLst>
-      <pc:sldChg chg="modSp">
-        <pc:chgData name="Bilal Sharqi" userId="d561ffde75f42bc1" providerId="LiveId" clId="{0F5F4506-6DB1-4EB6-80E4-A682BB529050}" dt="2020-08-26T22:20:56.344" v="0" actId="1076"/>
-        <pc:sldMkLst>
-          <pc:docMk/>
-          <pc:sldMk cId="3876689971" sldId="260"/>
-        </pc:sldMkLst>
-        <pc:picChg chg="mod">
-          <ac:chgData name="Bilal Sharqi" userId="d561ffde75f42bc1" providerId="LiveId" clId="{0F5F4506-6DB1-4EB6-80E4-A682BB529050}" dt="2020-08-26T22:20:56.344" v="0" actId="1076"/>
-          <ac:picMkLst>
-            <pc:docMk/>
-            <pc:sldMk cId="3876689971" sldId="260"/>
-            <ac:picMk id="3" creationId="{0A51F0E7-4FA2-4558-85B9-E2ABBB9B0688}"/>
-          </ac:picMkLst>
-        </pc:picChg>
-      </pc:sldChg>
-    </pc:docChg>
-  </pc:docChgLst>
   <pc:docChgLst>
     <pc:chgData name="Bilal Sharqi" userId="d561ffde75f42bc1" providerId="LiveId" clId="{FE8A36E2-369F-4A4A-8B9F-A320970EE2A2}"/>
     <pc:docChg chg="undo custSel mod addSld modSld">
@@ -362,6 +340,30 @@
       </pc:sldChg>
     </pc:docChg>
   </pc:docChgLst>
+  <pc:docChgLst>
+    <pc:chgData name="Bilal Sharqi" userId="d561ffde75f42bc1" providerId="LiveId" clId="{0F5F4506-6DB1-4EB6-80E4-A682BB529050}"/>
+    <pc:docChg chg="modSld">
+      <pc:chgData name="Bilal Sharqi" userId="d561ffde75f42bc1" providerId="LiveId" clId="{0F5F4506-6DB1-4EB6-80E4-A682BB529050}" dt="2020-08-26T22:20:56.344" v="0" actId="1076"/>
+      <pc:docMkLst>
+        <pc:docMk/>
+      </pc:docMkLst>
+      <pc:sldChg chg="modSp">
+        <pc:chgData name="Bilal Sharqi" userId="d561ffde75f42bc1" providerId="LiveId" clId="{0F5F4506-6DB1-4EB6-80E4-A682BB529050}" dt="2020-08-26T22:20:56.344" v="0" actId="1076"/>
+        <pc:sldMkLst>
+          <pc:docMk/>
+          <pc:sldMk cId="3876689971" sldId="260"/>
+        </pc:sldMkLst>
+        <pc:picChg chg="mod">
+          <ac:chgData name="Bilal Sharqi" userId="d561ffde75f42bc1" providerId="LiveId" clId="{0F5F4506-6DB1-4EB6-80E4-A682BB529050}" dt="2020-08-26T22:20:56.344" v="0" actId="1076"/>
+          <ac:picMkLst>
+            <pc:docMk/>
+            <pc:sldMk cId="3876689971" sldId="260"/>
+            <ac:picMk id="3" creationId="{0A51F0E7-4FA2-4558-85B9-E2ABBB9B0688}"/>
+          </ac:picMkLst>
+        </pc:picChg>
+      </pc:sldChg>
+    </pc:docChg>
+  </pc:docChgLst>
 </pc:chgInfo>
 </file>
 
@@ -512,7 +514,7 @@
           <a:p>
             <a:fld id="{0A106521-C08D-4E9A-BAED-CDD77228565C}" type="datetimeFigureOut">
               <a:rPr lang="en-US" smtClean="0"/>
-              <a:t>8/26/2020</a:t>
+              <a:t>9/17/2020</a:t>
             </a:fld>
             <a:endParaRPr lang="en-US"/>
           </a:p>
@@ -710,7 +712,7 @@
           <a:p>
             <a:fld id="{0A106521-C08D-4E9A-BAED-CDD77228565C}" type="datetimeFigureOut">
               <a:rPr lang="en-US" smtClean="0"/>
-              <a:t>8/26/2020</a:t>
+              <a:t>9/17/2020</a:t>
             </a:fld>
             <a:endParaRPr lang="en-US"/>
           </a:p>
@@ -918,7 +920,7 @@
           <a:p>
             <a:fld id="{0A106521-C08D-4E9A-BAED-CDD77228565C}" type="datetimeFigureOut">
               <a:rPr lang="en-US" smtClean="0"/>
-              <a:t>8/26/2020</a:t>
+              <a:t>9/17/2020</a:t>
             </a:fld>
             <a:endParaRPr lang="en-US"/>
           </a:p>
@@ -1116,7 +1118,7 @@
           <a:p>
             <a:fld id="{0A106521-C08D-4E9A-BAED-CDD77228565C}" type="datetimeFigureOut">
               <a:rPr lang="en-US" smtClean="0"/>
-              <a:t>8/26/2020</a:t>
+              <a:t>9/17/2020</a:t>
             </a:fld>
             <a:endParaRPr lang="en-US"/>
           </a:p>
@@ -1391,7 +1393,7 @@
           <a:p>
             <a:fld id="{0A106521-C08D-4E9A-BAED-CDD77228565C}" type="datetimeFigureOut">
               <a:rPr lang="en-US" smtClean="0"/>
-              <a:t>8/26/2020</a:t>
+              <a:t>9/17/2020</a:t>
             </a:fld>
             <a:endParaRPr lang="en-US"/>
           </a:p>
@@ -1656,7 +1658,7 @@
           <a:p>
             <a:fld id="{0A106521-C08D-4E9A-BAED-CDD77228565C}" type="datetimeFigureOut">
               <a:rPr lang="en-US" smtClean="0"/>
-              <a:t>8/26/2020</a:t>
+              <a:t>9/17/2020</a:t>
             </a:fld>
             <a:endParaRPr lang="en-US"/>
           </a:p>
@@ -2068,7 +2070,7 @@
           <a:p>
             <a:fld id="{0A106521-C08D-4E9A-BAED-CDD77228565C}" type="datetimeFigureOut">
               <a:rPr lang="en-US" smtClean="0"/>
-              <a:t>8/26/2020</a:t>
+              <a:t>9/17/2020</a:t>
             </a:fld>
             <a:endParaRPr lang="en-US"/>
           </a:p>
@@ -2209,7 +2211,7 @@
           <a:p>
             <a:fld id="{0A106521-C08D-4E9A-BAED-CDD77228565C}" type="datetimeFigureOut">
               <a:rPr lang="en-US" smtClean="0"/>
-              <a:t>8/26/2020</a:t>
+              <a:t>9/17/2020</a:t>
             </a:fld>
             <a:endParaRPr lang="en-US"/>
           </a:p>
@@ -2322,7 +2324,7 @@
           <a:p>
             <a:fld id="{0A106521-C08D-4E9A-BAED-CDD77228565C}" type="datetimeFigureOut">
               <a:rPr lang="en-US" smtClean="0"/>
-              <a:t>8/26/2020</a:t>
+              <a:t>9/17/2020</a:t>
             </a:fld>
             <a:endParaRPr lang="en-US"/>
           </a:p>
@@ -2633,7 +2635,7 @@
           <a:p>
             <a:fld id="{0A106521-C08D-4E9A-BAED-CDD77228565C}" type="datetimeFigureOut">
               <a:rPr lang="en-US" smtClean="0"/>
-              <a:t>8/26/2020</a:t>
+              <a:t>9/17/2020</a:t>
             </a:fld>
             <a:endParaRPr lang="en-US"/>
           </a:p>
@@ -2921,7 +2923,7 @@
           <a:p>
             <a:fld id="{0A106521-C08D-4E9A-BAED-CDD77228565C}" type="datetimeFigureOut">
               <a:rPr lang="en-US" smtClean="0"/>
-              <a:t>8/26/2020</a:t>
+              <a:t>9/17/2020</a:t>
             </a:fld>
             <a:endParaRPr lang="en-US"/>
           </a:p>
@@ -3162,7 +3164,7 @@
           <a:p>
             <a:fld id="{0A106521-C08D-4E9A-BAED-CDD77228565C}" type="datetimeFigureOut">
               <a:rPr lang="en-US" smtClean="0"/>
-              <a:t>8/26/2020</a:t>
+              <a:t>9/17/2020</a:t>
             </a:fld>
             <a:endParaRPr lang="en-US"/>
           </a:p>
@@ -6999,6 +7001,192 @@
 </p:sld>
 </file>
 
+<file path=ppt/slides/slide5.xml><?xml version="1.0" encoding="utf-8"?>
+<p:sld xmlns:a="http://schemas.openxmlformats.org/drawingml/2006/main" xmlns:r="http://schemas.openxmlformats.org/officeDocument/2006/relationships" xmlns:p="http://schemas.openxmlformats.org/presentationml/2006/main">
+  <p:cSld>
+    <p:spTree>
+      <p:nvGrpSpPr>
+        <p:cNvPr id="1" name=""/>
+        <p:cNvGrpSpPr/>
+        <p:nvPr/>
+      </p:nvGrpSpPr>
+      <p:grpSpPr>
+        <a:xfrm>
+          <a:off x="0" y="0"/>
+          <a:ext cx="0" cy="0"/>
+          <a:chOff x="0" y="0"/>
+          <a:chExt cx="0" cy="0"/>
+        </a:xfrm>
+      </p:grpSpPr>
+      <p:sp>
+        <p:nvSpPr>
+          <p:cNvPr id="2" name="Title 1">
+            <a:extLst>
+              <a:ext uri="{FF2B5EF4-FFF2-40B4-BE49-F238E27FC236}">
+                <a16:creationId xmlns:a16="http://schemas.microsoft.com/office/drawing/2014/main" id="{163491E8-32BF-4B90-886A-AF050F6E85D2}"/>
+              </a:ext>
+            </a:extLst>
+          </p:cNvPr>
+          <p:cNvSpPr>
+            <a:spLocks noGrp="1"/>
+          </p:cNvSpPr>
+          <p:nvPr>
+            <p:ph type="title"/>
+          </p:nvPr>
+        </p:nvSpPr>
+        <p:spPr/>
+        <p:txBody>
+          <a:bodyPr/>
+          <a:lstStyle/>
+          <a:p>
+            <a:r>
+              <a:rPr lang="en-US" dirty="0" err="1"/>
+              <a:t>uCRM</a:t>
+            </a:r>
+            <a:r>
+              <a:rPr lang="en-US" dirty="0"/>
+              <a:t> -2.5g</a:t>
+            </a:r>
+          </a:p>
+        </p:txBody>
+      </p:sp>
+      <p:pic>
+        <p:nvPicPr>
+          <p:cNvPr id="5" name="Picture 4">
+            <a:extLst>
+              <a:ext uri="{FF2B5EF4-FFF2-40B4-BE49-F238E27FC236}">
+                <a16:creationId xmlns:a16="http://schemas.microsoft.com/office/drawing/2014/main" id="{CBAE48CA-435B-4294-9DBC-71E6C0261DA5}"/>
+              </a:ext>
+            </a:extLst>
+          </p:cNvPr>
+          <p:cNvPicPr>
+            <a:picLocks noChangeAspect="1"/>
+          </p:cNvPicPr>
+          <p:nvPr/>
+        </p:nvPicPr>
+        <p:blipFill>
+          <a:blip r:embed="rId2"/>
+          <a:stretch>
+            <a:fillRect/>
+          </a:stretch>
+        </p:blipFill>
+        <p:spPr>
+          <a:xfrm>
+            <a:off x="0" y="1590498"/>
+            <a:ext cx="12192000" cy="3762068"/>
+          </a:xfrm>
+          <a:prstGeom prst="rect">
+            <a:avLst/>
+          </a:prstGeom>
+        </p:spPr>
+      </p:pic>
+    </p:spTree>
+    <p:extLst>
+      <p:ext uri="{BB962C8B-B14F-4D97-AF65-F5344CB8AC3E}">
+        <p14:creationId xmlns:p14="http://schemas.microsoft.com/office/powerpoint/2010/main" val="920295990"/>
+      </p:ext>
+    </p:extLst>
+  </p:cSld>
+  <p:clrMapOvr>
+    <a:masterClrMapping/>
+  </p:clrMapOvr>
+</p:sld>
+</file>
+
+<file path=ppt/slides/slide6.xml><?xml version="1.0" encoding="utf-8"?>
+<p:sld xmlns:a="http://schemas.openxmlformats.org/drawingml/2006/main" xmlns:r="http://schemas.openxmlformats.org/officeDocument/2006/relationships" xmlns:p="http://schemas.openxmlformats.org/presentationml/2006/main">
+  <p:cSld>
+    <p:spTree>
+      <p:nvGrpSpPr>
+        <p:cNvPr id="1" name=""/>
+        <p:cNvGrpSpPr/>
+        <p:nvPr/>
+      </p:nvGrpSpPr>
+      <p:grpSpPr>
+        <a:xfrm>
+          <a:off x="0" y="0"/>
+          <a:ext cx="0" cy="0"/>
+          <a:chOff x="0" y="0"/>
+          <a:chExt cx="0" cy="0"/>
+        </a:xfrm>
+      </p:grpSpPr>
+      <p:sp>
+        <p:nvSpPr>
+          <p:cNvPr id="2" name="Title 1">
+            <a:extLst>
+              <a:ext uri="{FF2B5EF4-FFF2-40B4-BE49-F238E27FC236}">
+                <a16:creationId xmlns:a16="http://schemas.microsoft.com/office/drawing/2014/main" id="{5CD12C05-5815-45DB-8AE4-20BDB4DEDA2B}"/>
+              </a:ext>
+            </a:extLst>
+          </p:cNvPr>
+          <p:cNvSpPr>
+            <a:spLocks noGrp="1"/>
+          </p:cNvSpPr>
+          <p:nvPr>
+            <p:ph type="title"/>
+          </p:nvPr>
+        </p:nvSpPr>
+        <p:spPr/>
+        <p:txBody>
+          <a:bodyPr/>
+          <a:lstStyle/>
+          <a:p>
+            <a:r>
+              <a:rPr lang="en-US" dirty="0" err="1"/>
+              <a:t>uCRM</a:t>
+            </a:r>
+            <a:r>
+              <a:rPr lang="en-US" dirty="0"/>
+              <a:t> 1g</a:t>
+            </a:r>
+          </a:p>
+        </p:txBody>
+      </p:sp>
+      <p:pic>
+        <p:nvPicPr>
+          <p:cNvPr id="4" name="Content Placeholder 3">
+            <a:extLst>
+              <a:ext uri="{FF2B5EF4-FFF2-40B4-BE49-F238E27FC236}">
+                <a16:creationId xmlns:a16="http://schemas.microsoft.com/office/drawing/2014/main" id="{2FC5C98E-A4B2-40FC-B95B-046843993848}"/>
+              </a:ext>
+            </a:extLst>
+          </p:cNvPr>
+          <p:cNvPicPr>
+            <a:picLocks noGrp="1" noChangeAspect="1"/>
+          </p:cNvPicPr>
+          <p:nvPr>
+            <p:ph idx="1"/>
+          </p:nvPr>
+        </p:nvPicPr>
+        <p:blipFill>
+          <a:blip r:embed="rId2"/>
+          <a:stretch>
+            <a:fillRect/>
+          </a:stretch>
+        </p:blipFill>
+        <p:spPr>
+          <a:xfrm>
+            <a:off x="18897" y="1977656"/>
+            <a:ext cx="12133473" cy="4040372"/>
+          </a:xfrm>
+          <a:prstGeom prst="rect">
+            <a:avLst/>
+          </a:prstGeom>
+        </p:spPr>
+      </p:pic>
+    </p:spTree>
+    <p:extLst>
+      <p:ext uri="{BB962C8B-B14F-4D97-AF65-F5344CB8AC3E}">
+        <p14:creationId xmlns:p14="http://schemas.microsoft.com/office/powerpoint/2010/main" val="2767459162"/>
+      </p:ext>
+    </p:extLst>
+  </p:cSld>
+  <p:clrMapOvr>
+    <a:masterClrMapping/>
+  </p:clrMapOvr>
+</p:sld>
+</file>
+
 <file path=ppt/theme/theme1.xml><?xml version="1.0" encoding="utf-8"?>
 <a:theme xmlns:a="http://schemas.openxmlformats.org/drawingml/2006/main" name="Office Theme">
   <a:themeElements>

</xml_diff>

<commit_message>
partial setup of SOL200 problem for mass minimization of NL beam
</commit_message>
<xml_diff>
--- a/Flowchart.pptx
+++ b/Flowchart.pptx
@@ -9,8 +9,15 @@
     <p:sldId id="260" r:id="rId3"/>
     <p:sldId id="258" r:id="rId4"/>
     <p:sldId id="259" r:id="rId5"/>
-    <p:sldId id="261" r:id="rId6"/>
-    <p:sldId id="262" r:id="rId7"/>
+    <p:sldId id="266" r:id="rId6"/>
+    <p:sldId id="265" r:id="rId7"/>
+    <p:sldId id="264" r:id="rId8"/>
+    <p:sldId id="263" r:id="rId9"/>
+    <p:sldId id="262" r:id="rId10"/>
+    <p:sldId id="261" r:id="rId11"/>
+    <p:sldId id="269" r:id="rId12"/>
+    <p:sldId id="268" r:id="rId13"/>
+    <p:sldId id="267" r:id="rId14"/>
   </p:sldIdLst>
   <p:sldSz cx="12192000" cy="6858000"/>
   <p:notesSz cx="6858000" cy="9144000"/>
@@ -3940,6 +3947,361 @@
     <p:extLst>
       <p:ext uri="{BB962C8B-B14F-4D97-AF65-F5344CB8AC3E}">
         <p14:creationId xmlns:p14="http://schemas.microsoft.com/office/powerpoint/2010/main" val="1498054658"/>
+      </p:ext>
+    </p:extLst>
+  </p:cSld>
+  <p:clrMapOvr>
+    <a:masterClrMapping/>
+  </p:clrMapOvr>
+</p:sld>
+</file>
+
+<file path=ppt/slides/slide10.xml><?xml version="1.0" encoding="utf-8"?>
+<p:sld xmlns:a="http://schemas.openxmlformats.org/drawingml/2006/main" xmlns:r="http://schemas.openxmlformats.org/officeDocument/2006/relationships" xmlns:p="http://schemas.openxmlformats.org/presentationml/2006/main">
+  <p:cSld>
+    <p:spTree>
+      <p:nvGrpSpPr>
+        <p:cNvPr id="1" name=""/>
+        <p:cNvGrpSpPr/>
+        <p:nvPr/>
+      </p:nvGrpSpPr>
+      <p:grpSpPr>
+        <a:xfrm>
+          <a:off x="0" y="0"/>
+          <a:ext cx="0" cy="0"/>
+          <a:chOff x="0" y="0"/>
+          <a:chExt cx="0" cy="0"/>
+        </a:xfrm>
+      </p:grpSpPr>
+      <p:sp>
+        <p:nvSpPr>
+          <p:cNvPr id="2" name="Title 1">
+            <a:extLst>
+              <a:ext uri="{FF2B5EF4-FFF2-40B4-BE49-F238E27FC236}">
+                <a16:creationId xmlns:a16="http://schemas.microsoft.com/office/drawing/2014/main" id="{163491E8-32BF-4B90-886A-AF050F6E85D2}"/>
+              </a:ext>
+            </a:extLst>
+          </p:cNvPr>
+          <p:cNvSpPr>
+            <a:spLocks noGrp="1"/>
+          </p:cNvSpPr>
+          <p:nvPr>
+            <p:ph type="title"/>
+          </p:nvPr>
+        </p:nvSpPr>
+        <p:spPr/>
+        <p:txBody>
+          <a:bodyPr/>
+          <a:lstStyle/>
+          <a:p>
+            <a:r>
+              <a:rPr lang="en-US" dirty="0" err="1"/>
+              <a:t>uCRM</a:t>
+            </a:r>
+            <a:r>
+              <a:rPr lang="en-US" dirty="0"/>
+              <a:t> -2.5g</a:t>
+            </a:r>
+          </a:p>
+        </p:txBody>
+      </p:sp>
+      <p:pic>
+        <p:nvPicPr>
+          <p:cNvPr id="3" name="Picture 2">
+            <a:extLst>
+              <a:ext uri="{FF2B5EF4-FFF2-40B4-BE49-F238E27FC236}">
+                <a16:creationId xmlns:a16="http://schemas.microsoft.com/office/drawing/2014/main" id="{88D4AA59-AB80-4DB9-9107-8447EA5AA5A6}"/>
+              </a:ext>
+            </a:extLst>
+          </p:cNvPr>
+          <p:cNvPicPr>
+            <a:picLocks noChangeAspect="1"/>
+          </p:cNvPicPr>
+          <p:nvPr/>
+        </p:nvPicPr>
+        <p:blipFill>
+          <a:blip r:embed="rId2"/>
+          <a:stretch>
+            <a:fillRect/>
+          </a:stretch>
+        </p:blipFill>
+        <p:spPr>
+          <a:xfrm>
+            <a:off x="0" y="1575591"/>
+            <a:ext cx="12192000" cy="3706817"/>
+          </a:xfrm>
+          <a:prstGeom prst="rect">
+            <a:avLst/>
+          </a:prstGeom>
+        </p:spPr>
+      </p:pic>
+    </p:spTree>
+    <p:extLst>
+      <p:ext uri="{BB962C8B-B14F-4D97-AF65-F5344CB8AC3E}">
+        <p14:creationId xmlns:p14="http://schemas.microsoft.com/office/powerpoint/2010/main" val="920295990"/>
+      </p:ext>
+    </p:extLst>
+  </p:cSld>
+  <p:clrMapOvr>
+    <a:masterClrMapping/>
+  </p:clrMapOvr>
+</p:sld>
+</file>
+
+<file path=ppt/slides/slide11.xml><?xml version="1.0" encoding="utf-8"?>
+<p:sld xmlns:a="http://schemas.openxmlformats.org/drawingml/2006/main" xmlns:r="http://schemas.openxmlformats.org/officeDocument/2006/relationships" xmlns:p="http://schemas.openxmlformats.org/presentationml/2006/main">
+  <p:cSld>
+    <p:spTree>
+      <p:nvGrpSpPr>
+        <p:cNvPr id="1" name=""/>
+        <p:cNvGrpSpPr/>
+        <p:nvPr/>
+      </p:nvGrpSpPr>
+      <p:grpSpPr>
+        <a:xfrm>
+          <a:off x="0" y="0"/>
+          <a:ext cx="0" cy="0"/>
+          <a:chOff x="0" y="0"/>
+          <a:chExt cx="0" cy="0"/>
+        </a:xfrm>
+      </p:grpSpPr>
+      <p:sp>
+        <p:nvSpPr>
+          <p:cNvPr id="2" name="Title 1">
+            <a:extLst>
+              <a:ext uri="{FF2B5EF4-FFF2-40B4-BE49-F238E27FC236}">
+                <a16:creationId xmlns:a16="http://schemas.microsoft.com/office/drawing/2014/main" id="{83E77533-A450-4292-993A-B09077B88C46}"/>
+              </a:ext>
+            </a:extLst>
+          </p:cNvPr>
+          <p:cNvSpPr>
+            <a:spLocks noGrp="1"/>
+          </p:cNvSpPr>
+          <p:nvPr>
+            <p:ph type="title"/>
+          </p:nvPr>
+        </p:nvSpPr>
+        <p:spPr/>
+        <p:txBody>
+          <a:bodyPr/>
+          <a:lstStyle/>
+          <a:p>
+            <a:r>
+              <a:rPr lang="en-US" dirty="0"/>
+              <a:t>ASE Wing 10^-6 g</a:t>
+            </a:r>
+          </a:p>
+        </p:txBody>
+      </p:sp>
+      <p:pic>
+        <p:nvPicPr>
+          <p:cNvPr id="4" name="Picture 3">
+            <a:extLst>
+              <a:ext uri="{FF2B5EF4-FFF2-40B4-BE49-F238E27FC236}">
+                <a16:creationId xmlns:a16="http://schemas.microsoft.com/office/drawing/2014/main" id="{6B2556B7-C14B-4107-B67B-AA7D791F54A7}"/>
+              </a:ext>
+            </a:extLst>
+          </p:cNvPr>
+          <p:cNvPicPr>
+            <a:picLocks noChangeAspect="1"/>
+          </p:cNvPicPr>
+          <p:nvPr/>
+        </p:nvPicPr>
+        <p:blipFill>
+          <a:blip r:embed="rId2"/>
+          <a:stretch>
+            <a:fillRect/>
+          </a:stretch>
+        </p:blipFill>
+        <p:spPr>
+          <a:xfrm>
+            <a:off x="0" y="2188688"/>
+            <a:ext cx="12192000" cy="2480623"/>
+          </a:xfrm>
+          <a:prstGeom prst="rect">
+            <a:avLst/>
+          </a:prstGeom>
+        </p:spPr>
+      </p:pic>
+    </p:spTree>
+    <p:extLst>
+      <p:ext uri="{BB962C8B-B14F-4D97-AF65-F5344CB8AC3E}">
+        <p14:creationId xmlns:p14="http://schemas.microsoft.com/office/powerpoint/2010/main" val="1633276753"/>
+      </p:ext>
+    </p:extLst>
+  </p:cSld>
+  <p:clrMapOvr>
+    <a:masterClrMapping/>
+  </p:clrMapOvr>
+</p:sld>
+</file>
+
+<file path=ppt/slides/slide12.xml><?xml version="1.0" encoding="utf-8"?>
+<p:sld xmlns:a="http://schemas.openxmlformats.org/drawingml/2006/main" xmlns:r="http://schemas.openxmlformats.org/officeDocument/2006/relationships" xmlns:p="http://schemas.openxmlformats.org/presentationml/2006/main">
+  <p:cSld>
+    <p:spTree>
+      <p:nvGrpSpPr>
+        <p:cNvPr id="1" name=""/>
+        <p:cNvGrpSpPr/>
+        <p:nvPr/>
+      </p:nvGrpSpPr>
+      <p:grpSpPr>
+        <a:xfrm>
+          <a:off x="0" y="0"/>
+          <a:ext cx="0" cy="0"/>
+          <a:chOff x="0" y="0"/>
+          <a:chExt cx="0" cy="0"/>
+        </a:xfrm>
+      </p:grpSpPr>
+      <p:sp>
+        <p:nvSpPr>
+          <p:cNvPr id="2" name="Title 1">
+            <a:extLst>
+              <a:ext uri="{FF2B5EF4-FFF2-40B4-BE49-F238E27FC236}">
+                <a16:creationId xmlns:a16="http://schemas.microsoft.com/office/drawing/2014/main" id="{E07D2662-6BA7-45F5-9E71-2F3A25105B88}"/>
+              </a:ext>
+            </a:extLst>
+          </p:cNvPr>
+          <p:cNvSpPr>
+            <a:spLocks noGrp="1"/>
+          </p:cNvSpPr>
+          <p:nvPr>
+            <p:ph type="title"/>
+          </p:nvPr>
+        </p:nvSpPr>
+        <p:spPr/>
+        <p:txBody>
+          <a:bodyPr/>
+          <a:lstStyle/>
+          <a:p>
+            <a:r>
+              <a:rPr lang="en-US" dirty="0"/>
+              <a:t>ASE Wing 1g</a:t>
+            </a:r>
+          </a:p>
+        </p:txBody>
+      </p:sp>
+      <p:pic>
+        <p:nvPicPr>
+          <p:cNvPr id="4" name="Picture 3">
+            <a:extLst>
+              <a:ext uri="{FF2B5EF4-FFF2-40B4-BE49-F238E27FC236}">
+                <a16:creationId xmlns:a16="http://schemas.microsoft.com/office/drawing/2014/main" id="{73829A83-3CC8-4B46-BF96-F690C80B12B7}"/>
+              </a:ext>
+            </a:extLst>
+          </p:cNvPr>
+          <p:cNvPicPr>
+            <a:picLocks noChangeAspect="1"/>
+          </p:cNvPicPr>
+          <p:nvPr/>
+        </p:nvPicPr>
+        <p:blipFill>
+          <a:blip r:embed="rId2"/>
+          <a:stretch>
+            <a:fillRect/>
+          </a:stretch>
+        </p:blipFill>
+        <p:spPr>
+          <a:xfrm>
+            <a:off x="0" y="2325364"/>
+            <a:ext cx="12192000" cy="2207272"/>
+          </a:xfrm>
+          <a:prstGeom prst="rect">
+            <a:avLst/>
+          </a:prstGeom>
+        </p:spPr>
+      </p:pic>
+    </p:spTree>
+    <p:extLst>
+      <p:ext uri="{BB962C8B-B14F-4D97-AF65-F5344CB8AC3E}">
+        <p14:creationId xmlns:p14="http://schemas.microsoft.com/office/powerpoint/2010/main" val="3322082201"/>
+      </p:ext>
+    </p:extLst>
+  </p:cSld>
+  <p:clrMapOvr>
+    <a:masterClrMapping/>
+  </p:clrMapOvr>
+</p:sld>
+</file>
+
+<file path=ppt/slides/slide13.xml><?xml version="1.0" encoding="utf-8"?>
+<p:sld xmlns:a="http://schemas.openxmlformats.org/drawingml/2006/main" xmlns:r="http://schemas.openxmlformats.org/officeDocument/2006/relationships" xmlns:p="http://schemas.openxmlformats.org/presentationml/2006/main">
+  <p:cSld>
+    <p:spTree>
+      <p:nvGrpSpPr>
+        <p:cNvPr id="1" name=""/>
+        <p:cNvGrpSpPr/>
+        <p:nvPr/>
+      </p:nvGrpSpPr>
+      <p:grpSpPr>
+        <a:xfrm>
+          <a:off x="0" y="0"/>
+          <a:ext cx="0" cy="0"/>
+          <a:chOff x="0" y="0"/>
+          <a:chExt cx="0" cy="0"/>
+        </a:xfrm>
+      </p:grpSpPr>
+      <p:sp>
+        <p:nvSpPr>
+          <p:cNvPr id="2" name="Title 1">
+            <a:extLst>
+              <a:ext uri="{FF2B5EF4-FFF2-40B4-BE49-F238E27FC236}">
+                <a16:creationId xmlns:a16="http://schemas.microsoft.com/office/drawing/2014/main" id="{41CFD34D-D51A-4A07-BEAD-37EC9CF7C032}"/>
+              </a:ext>
+            </a:extLst>
+          </p:cNvPr>
+          <p:cNvSpPr>
+            <a:spLocks noGrp="1"/>
+          </p:cNvSpPr>
+          <p:nvPr>
+            <p:ph type="title"/>
+          </p:nvPr>
+        </p:nvSpPr>
+        <p:spPr/>
+        <p:txBody>
+          <a:bodyPr/>
+          <a:lstStyle/>
+          <a:p>
+            <a:r>
+              <a:rPr lang="en-US" dirty="0"/>
+              <a:t>ASE Wing -2.5g</a:t>
+            </a:r>
+          </a:p>
+        </p:txBody>
+      </p:sp>
+      <p:pic>
+        <p:nvPicPr>
+          <p:cNvPr id="4" name="Picture 3">
+            <a:extLst>
+              <a:ext uri="{FF2B5EF4-FFF2-40B4-BE49-F238E27FC236}">
+                <a16:creationId xmlns:a16="http://schemas.microsoft.com/office/drawing/2014/main" id="{9A09270C-ECAF-458E-97AA-6F0F108F2C58}"/>
+              </a:ext>
+            </a:extLst>
+          </p:cNvPr>
+          <p:cNvPicPr>
+            <a:picLocks noChangeAspect="1"/>
+          </p:cNvPicPr>
+          <p:nvPr/>
+        </p:nvPicPr>
+        <p:blipFill rotWithShape="1">
+          <a:blip r:embed="rId2"/>
+          <a:srcRect t="5475" b="16447"/>
+          <a:stretch/>
+        </p:blipFill>
+        <p:spPr>
+          <a:xfrm>
+            <a:off x="0" y="1690688"/>
+            <a:ext cx="12192000" cy="3048289"/>
+          </a:xfrm>
+          <a:prstGeom prst="rect">
+            <a:avLst/>
+          </a:prstGeom>
+        </p:spPr>
+      </p:pic>
+    </p:spTree>
+    <p:extLst>
+      <p:ext uri="{BB962C8B-B14F-4D97-AF65-F5344CB8AC3E}">
+        <p14:creationId xmlns:p14="http://schemas.microsoft.com/office/powerpoint/2010/main" val="947304214"/>
       </p:ext>
     </p:extLst>
   </p:cSld>
@@ -7023,7 +7385,7 @@
           <p:cNvPr id="2" name="Title 1">
             <a:extLst>
               <a:ext uri="{FF2B5EF4-FFF2-40B4-BE49-F238E27FC236}">
-                <a16:creationId xmlns:a16="http://schemas.microsoft.com/office/drawing/2014/main" id="{163491E8-32BF-4B90-886A-AF050F6E85D2}"/>
+                <a16:creationId xmlns:a16="http://schemas.microsoft.com/office/drawing/2014/main" id="{213F0674-0CB3-44B2-A6A3-C530380719DE}"/>
               </a:ext>
             </a:extLst>
           </p:cNvPr>
@@ -7041,21 +7403,21 @@
           <a:p>
             <a:r>
               <a:rPr lang="en-US" dirty="0" err="1"/>
-              <a:t>uCRM</a:t>
+              <a:t>Nl</a:t>
             </a:r>
             <a:r>
               <a:rPr lang="en-US" dirty="0"/>
-              <a:t> -2.5g</a:t>
+              <a:t> beam 0g</a:t>
             </a:r>
           </a:p>
         </p:txBody>
       </p:sp>
       <p:pic>
         <p:nvPicPr>
-          <p:cNvPr id="5" name="Picture 4">
-            <a:extLst>
-              <a:ext uri="{FF2B5EF4-FFF2-40B4-BE49-F238E27FC236}">
-                <a16:creationId xmlns:a16="http://schemas.microsoft.com/office/drawing/2014/main" id="{CBAE48CA-435B-4294-9DBC-71E6C0261DA5}"/>
+          <p:cNvPr id="3" name="Picture 2">
+            <a:extLst>
+              <a:ext uri="{FF2B5EF4-FFF2-40B4-BE49-F238E27FC236}">
+                <a16:creationId xmlns:a16="http://schemas.microsoft.com/office/drawing/2014/main" id="{9D56B99E-E6D6-4640-8B52-A47347A4DF6C}"/>
               </a:ext>
             </a:extLst>
           </p:cNvPr>
@@ -7072,8 +7434,8 @@
         </p:blipFill>
         <p:spPr>
           <a:xfrm>
-            <a:off x="0" y="1590498"/>
-            <a:ext cx="12192000" cy="3762068"/>
+            <a:off x="0" y="2313670"/>
+            <a:ext cx="12192000" cy="2230659"/>
           </a:xfrm>
           <a:prstGeom prst="rect">
             <a:avLst/>
@@ -7083,7 +7445,7 @@
     </p:spTree>
     <p:extLst>
       <p:ext uri="{BB962C8B-B14F-4D97-AF65-F5344CB8AC3E}">
-        <p14:creationId xmlns:p14="http://schemas.microsoft.com/office/powerpoint/2010/main" val="920295990"/>
+        <p14:creationId xmlns:p14="http://schemas.microsoft.com/office/powerpoint/2010/main" val="3380843220"/>
       </p:ext>
     </p:extLst>
   </p:cSld>
@@ -7115,7 +7477,7 @@
           <p:cNvPr id="2" name="Title 1">
             <a:extLst>
               <a:ext uri="{FF2B5EF4-FFF2-40B4-BE49-F238E27FC236}">
-                <a16:creationId xmlns:a16="http://schemas.microsoft.com/office/drawing/2014/main" id="{5CD12C05-5815-45DB-8AE4-20BDB4DEDA2B}"/>
+                <a16:creationId xmlns:a16="http://schemas.microsoft.com/office/drawing/2014/main" id="{213F0674-0CB3-44B2-A6A3-C530380719DE}"/>
               </a:ext>
             </a:extLst>
           </p:cNvPr>
@@ -7133,30 +7495,28 @@
           <a:p>
             <a:r>
               <a:rPr lang="en-US" dirty="0" err="1"/>
-              <a:t>uCRM</a:t>
+              <a:t>Nl</a:t>
             </a:r>
             <a:r>
               <a:rPr lang="en-US" dirty="0"/>
-              <a:t> 1g</a:t>
+              <a:t> beam 1g</a:t>
             </a:r>
           </a:p>
         </p:txBody>
       </p:sp>
       <p:pic>
         <p:nvPicPr>
-          <p:cNvPr id="4" name="Content Placeholder 3">
-            <a:extLst>
-              <a:ext uri="{FF2B5EF4-FFF2-40B4-BE49-F238E27FC236}">
-                <a16:creationId xmlns:a16="http://schemas.microsoft.com/office/drawing/2014/main" id="{2FC5C98E-A4B2-40FC-B95B-046843993848}"/>
+          <p:cNvPr id="3" name="Picture 2">
+            <a:extLst>
+              <a:ext uri="{FF2B5EF4-FFF2-40B4-BE49-F238E27FC236}">
+                <a16:creationId xmlns:a16="http://schemas.microsoft.com/office/drawing/2014/main" id="{E73FBE9C-DEDA-4901-BE9C-04F7680A6806}"/>
               </a:ext>
             </a:extLst>
           </p:cNvPr>
           <p:cNvPicPr>
-            <a:picLocks noGrp="1" noChangeAspect="1"/>
+            <a:picLocks noChangeAspect="1"/>
           </p:cNvPicPr>
-          <p:nvPr>
-            <p:ph idx="1"/>
-          </p:nvPr>
+          <p:nvPr/>
         </p:nvPicPr>
         <p:blipFill>
           <a:blip r:embed="rId2"/>
@@ -7166,8 +7526,284 @@
         </p:blipFill>
         <p:spPr>
           <a:xfrm>
-            <a:off x="18897" y="1977656"/>
-            <a:ext cx="12133473" cy="4040372"/>
+            <a:off x="0" y="2364394"/>
+            <a:ext cx="12192000" cy="2129211"/>
+          </a:xfrm>
+          <a:prstGeom prst="rect">
+            <a:avLst/>
+          </a:prstGeom>
+        </p:spPr>
+      </p:pic>
+    </p:spTree>
+    <p:extLst>
+      <p:ext uri="{BB962C8B-B14F-4D97-AF65-F5344CB8AC3E}">
+        <p14:creationId xmlns:p14="http://schemas.microsoft.com/office/powerpoint/2010/main" val="3592660457"/>
+      </p:ext>
+    </p:extLst>
+  </p:cSld>
+  <p:clrMapOvr>
+    <a:masterClrMapping/>
+  </p:clrMapOvr>
+</p:sld>
+</file>
+
+<file path=ppt/slides/slide7.xml><?xml version="1.0" encoding="utf-8"?>
+<p:sld xmlns:a="http://schemas.openxmlformats.org/drawingml/2006/main" xmlns:r="http://schemas.openxmlformats.org/officeDocument/2006/relationships" xmlns:p="http://schemas.openxmlformats.org/presentationml/2006/main">
+  <p:cSld>
+    <p:spTree>
+      <p:nvGrpSpPr>
+        <p:cNvPr id="1" name=""/>
+        <p:cNvGrpSpPr/>
+        <p:nvPr/>
+      </p:nvGrpSpPr>
+      <p:grpSpPr>
+        <a:xfrm>
+          <a:off x="0" y="0"/>
+          <a:ext cx="0" cy="0"/>
+          <a:chOff x="0" y="0"/>
+          <a:chExt cx="0" cy="0"/>
+        </a:xfrm>
+      </p:grpSpPr>
+      <p:sp>
+        <p:nvSpPr>
+          <p:cNvPr id="2" name="Title 1">
+            <a:extLst>
+              <a:ext uri="{FF2B5EF4-FFF2-40B4-BE49-F238E27FC236}">
+                <a16:creationId xmlns:a16="http://schemas.microsoft.com/office/drawing/2014/main" id="{213F0674-0CB3-44B2-A6A3-C530380719DE}"/>
+              </a:ext>
+            </a:extLst>
+          </p:cNvPr>
+          <p:cNvSpPr>
+            <a:spLocks noGrp="1"/>
+          </p:cNvSpPr>
+          <p:nvPr>
+            <p:ph type="title"/>
+          </p:nvPr>
+        </p:nvSpPr>
+        <p:spPr/>
+        <p:txBody>
+          <a:bodyPr/>
+          <a:lstStyle/>
+          <a:p>
+            <a:r>
+              <a:rPr lang="en-US" dirty="0" err="1"/>
+              <a:t>Nl</a:t>
+            </a:r>
+            <a:r>
+              <a:rPr lang="en-US" dirty="0"/>
+              <a:t> beam -2.5g</a:t>
+            </a:r>
+          </a:p>
+        </p:txBody>
+      </p:sp>
+      <p:pic>
+        <p:nvPicPr>
+          <p:cNvPr id="4" name="Picture 3">
+            <a:extLst>
+              <a:ext uri="{FF2B5EF4-FFF2-40B4-BE49-F238E27FC236}">
+                <a16:creationId xmlns:a16="http://schemas.microsoft.com/office/drawing/2014/main" id="{B3249CEA-6988-4D3E-88DF-80DA499359EF}"/>
+              </a:ext>
+            </a:extLst>
+          </p:cNvPr>
+          <p:cNvPicPr>
+            <a:picLocks noChangeAspect="1"/>
+          </p:cNvPicPr>
+          <p:nvPr/>
+        </p:nvPicPr>
+        <p:blipFill>
+          <a:blip r:embed="rId2"/>
+          <a:stretch>
+            <a:fillRect/>
+          </a:stretch>
+        </p:blipFill>
+        <p:spPr>
+          <a:xfrm>
+            <a:off x="0" y="2067340"/>
+            <a:ext cx="12192000" cy="2723319"/>
+          </a:xfrm>
+          <a:prstGeom prst="rect">
+            <a:avLst/>
+          </a:prstGeom>
+        </p:spPr>
+      </p:pic>
+    </p:spTree>
+    <p:extLst>
+      <p:ext uri="{BB962C8B-B14F-4D97-AF65-F5344CB8AC3E}">
+        <p14:creationId xmlns:p14="http://schemas.microsoft.com/office/powerpoint/2010/main" val="1151465049"/>
+      </p:ext>
+    </p:extLst>
+  </p:cSld>
+  <p:clrMapOvr>
+    <a:masterClrMapping/>
+  </p:clrMapOvr>
+</p:sld>
+</file>
+
+<file path=ppt/slides/slide8.xml><?xml version="1.0" encoding="utf-8"?>
+<p:sld xmlns:a="http://schemas.openxmlformats.org/drawingml/2006/main" xmlns:r="http://schemas.openxmlformats.org/officeDocument/2006/relationships" xmlns:p="http://schemas.openxmlformats.org/presentationml/2006/main">
+  <p:cSld>
+    <p:spTree>
+      <p:nvGrpSpPr>
+        <p:cNvPr id="1" name=""/>
+        <p:cNvGrpSpPr/>
+        <p:nvPr/>
+      </p:nvGrpSpPr>
+      <p:grpSpPr>
+        <a:xfrm>
+          <a:off x="0" y="0"/>
+          <a:ext cx="0" cy="0"/>
+          <a:chOff x="0" y="0"/>
+          <a:chExt cx="0" cy="0"/>
+        </a:xfrm>
+      </p:grpSpPr>
+      <p:sp>
+        <p:nvSpPr>
+          <p:cNvPr id="2" name="Title 1">
+            <a:extLst>
+              <a:ext uri="{FF2B5EF4-FFF2-40B4-BE49-F238E27FC236}">
+                <a16:creationId xmlns:a16="http://schemas.microsoft.com/office/drawing/2014/main" id="{EB911AA6-C683-4195-9B42-F47B211F220C}"/>
+              </a:ext>
+            </a:extLst>
+          </p:cNvPr>
+          <p:cNvSpPr>
+            <a:spLocks noGrp="1"/>
+          </p:cNvSpPr>
+          <p:nvPr>
+            <p:ph type="title"/>
+          </p:nvPr>
+        </p:nvSpPr>
+        <p:spPr/>
+        <p:txBody>
+          <a:bodyPr/>
+          <a:lstStyle/>
+          <a:p>
+            <a:r>
+              <a:rPr lang="en-US" dirty="0" err="1"/>
+              <a:t>uCRM</a:t>
+            </a:r>
+            <a:r>
+              <a:rPr lang="en-US" dirty="0"/>
+              <a:t> 10^-6 g</a:t>
+            </a:r>
+          </a:p>
+        </p:txBody>
+      </p:sp>
+      <p:pic>
+        <p:nvPicPr>
+          <p:cNvPr id="7" name="Picture 6">
+            <a:extLst>
+              <a:ext uri="{FF2B5EF4-FFF2-40B4-BE49-F238E27FC236}">
+                <a16:creationId xmlns:a16="http://schemas.microsoft.com/office/drawing/2014/main" id="{8939FDB8-3D84-4516-B97F-F64087660A3D}"/>
+              </a:ext>
+            </a:extLst>
+          </p:cNvPr>
+          <p:cNvPicPr>
+            <a:picLocks noChangeAspect="1"/>
+          </p:cNvPicPr>
+          <p:nvPr/>
+        </p:nvPicPr>
+        <p:blipFill>
+          <a:blip r:embed="rId2"/>
+          <a:stretch>
+            <a:fillRect/>
+          </a:stretch>
+        </p:blipFill>
+        <p:spPr>
+          <a:xfrm>
+            <a:off x="0" y="1912640"/>
+            <a:ext cx="12192000" cy="3086504"/>
+          </a:xfrm>
+          <a:prstGeom prst="rect">
+            <a:avLst/>
+          </a:prstGeom>
+        </p:spPr>
+      </p:pic>
+    </p:spTree>
+    <p:extLst>
+      <p:ext uri="{BB962C8B-B14F-4D97-AF65-F5344CB8AC3E}">
+        <p14:creationId xmlns:p14="http://schemas.microsoft.com/office/powerpoint/2010/main" val="390601535"/>
+      </p:ext>
+    </p:extLst>
+  </p:cSld>
+  <p:clrMapOvr>
+    <a:masterClrMapping/>
+  </p:clrMapOvr>
+</p:sld>
+</file>
+
+<file path=ppt/slides/slide9.xml><?xml version="1.0" encoding="utf-8"?>
+<p:sld xmlns:a="http://schemas.openxmlformats.org/drawingml/2006/main" xmlns:r="http://schemas.openxmlformats.org/officeDocument/2006/relationships" xmlns:p="http://schemas.openxmlformats.org/presentationml/2006/main">
+  <p:cSld>
+    <p:spTree>
+      <p:nvGrpSpPr>
+        <p:cNvPr id="1" name=""/>
+        <p:cNvGrpSpPr/>
+        <p:nvPr/>
+      </p:nvGrpSpPr>
+      <p:grpSpPr>
+        <a:xfrm>
+          <a:off x="0" y="0"/>
+          <a:ext cx="0" cy="0"/>
+          <a:chOff x="0" y="0"/>
+          <a:chExt cx="0" cy="0"/>
+        </a:xfrm>
+      </p:grpSpPr>
+      <p:sp>
+        <p:nvSpPr>
+          <p:cNvPr id="2" name="Title 1">
+            <a:extLst>
+              <a:ext uri="{FF2B5EF4-FFF2-40B4-BE49-F238E27FC236}">
+                <a16:creationId xmlns:a16="http://schemas.microsoft.com/office/drawing/2014/main" id="{5CD12C05-5815-45DB-8AE4-20BDB4DEDA2B}"/>
+              </a:ext>
+            </a:extLst>
+          </p:cNvPr>
+          <p:cNvSpPr>
+            <a:spLocks noGrp="1"/>
+          </p:cNvSpPr>
+          <p:nvPr>
+            <p:ph type="title"/>
+          </p:nvPr>
+        </p:nvSpPr>
+        <p:spPr/>
+        <p:txBody>
+          <a:bodyPr/>
+          <a:lstStyle/>
+          <a:p>
+            <a:r>
+              <a:rPr lang="en-US" dirty="0" err="1"/>
+              <a:t>uCRM</a:t>
+            </a:r>
+            <a:r>
+              <a:rPr lang="en-US" dirty="0"/>
+              <a:t> 1g</a:t>
+            </a:r>
+          </a:p>
+        </p:txBody>
+      </p:sp>
+      <p:pic>
+        <p:nvPicPr>
+          <p:cNvPr id="6" name="Picture 5">
+            <a:extLst>
+              <a:ext uri="{FF2B5EF4-FFF2-40B4-BE49-F238E27FC236}">
+                <a16:creationId xmlns:a16="http://schemas.microsoft.com/office/drawing/2014/main" id="{9F3AA2C5-AED9-48BB-8F80-D07C82C37104}"/>
+              </a:ext>
+            </a:extLst>
+          </p:cNvPr>
+          <p:cNvPicPr>
+            <a:picLocks noChangeAspect="1"/>
+          </p:cNvPicPr>
+          <p:nvPr/>
+        </p:nvPicPr>
+        <p:blipFill>
+          <a:blip r:embed="rId2"/>
+          <a:stretch>
+            <a:fillRect/>
+          </a:stretch>
+        </p:blipFill>
+        <p:spPr>
+          <a:xfrm>
+            <a:off x="0" y="1784742"/>
+            <a:ext cx="12192000" cy="3288516"/>
           </a:xfrm>
           <a:prstGeom prst="rect">
             <a:avLst/>

</xml_diff>